<commit_message>
fix summary text placement, summary lines, changes to default template
</commit_message>
<xml_diff>
--- a/Debak/Templates/Template_1_default.pptx
+++ b/Debak/Templates/Template_1_default.pptx
@@ -20700,14 +20700,14 @@
         <a:srgbClr val="666699"/>
       </a:folHlink>
     </a:clrScheme>
-    <a:fontScheme name="Calibri Light-Constantia">
+    <a:fontScheme name="Cambria">
       <a:majorFont>
-        <a:latin typeface="Calibri Light" panose="020F0302020204030204"/>
+        <a:latin typeface="Cambria" panose="02040503050406030204"/>
         <a:ea typeface=""/>
         <a:cs typeface=""/>
-        <a:font script="Jpan" typeface="メイリオ"/>
+        <a:font script="Jpan" typeface="HG明朝B"/>
         <a:font script="Hang" typeface="맑은 고딕"/>
-        <a:font script="Hans" typeface="宋体"/>
+        <a:font script="Hans" typeface="黑体"/>
         <a:font script="Hant" typeface="新細明體"/>
         <a:font script="Arab" typeface="Times New Roman"/>
         <a:font script="Hebr" typeface="Times New Roman"/>
@@ -20737,16 +20737,16 @@
         <a:font script="Geor" typeface="Sylfaen"/>
       </a:majorFont>
       <a:minorFont>
-        <a:latin typeface="Constantia" panose="02030602050306030303"/>
+        <a:latin typeface="Cambria" panose="02040503050406030204"/>
         <a:ea typeface=""/>
         <a:cs typeface=""/>
-        <a:font script="Jpan" typeface="HG明朝E"/>
-        <a:font script="Hang" typeface="궁서"/>
-        <a:font script="Hans" typeface="华文新魏"/>
-        <a:font script="Hant" typeface="標楷體"/>
+        <a:font script="Jpan" typeface="HG明朝B"/>
+        <a:font script="Hang" typeface="맑은 고딕"/>
+        <a:font script="Hans" typeface="黑体"/>
+        <a:font script="Hant" typeface="新細明體"/>
         <a:font script="Arab" typeface="Times New Roman"/>
         <a:font script="Hebr" typeface="Times New Roman"/>
-        <a:font script="Thai" typeface="Browallia New"/>
+        <a:font script="Thai" typeface="Angsana New"/>
         <a:font script="Ethi" typeface="Nyala"/>
         <a:font script="Beng" typeface="Vrinda"/>
         <a:font script="Gujr" typeface="Shruti"/>

</xml_diff>